<commit_message>
them chuc nang google map , chuc nang vi tri hien tai , vi tri noi tham gia tinh nguyen
</commit_message>
<xml_diff>
--- a/AD/Presentation1.pptx
+++ b/AD/Presentation1.pptx
@@ -243,7 +243,7 @@
           <a:p>
             <a:fld id="{40C91488-E430-459B-BBDA-D24562176EC4}" type="datetimeFigureOut">
               <a:rPr lang="en-US" smtClean="0"/>
-              <a:t>2017-12-30</a:t>
+              <a:t>2018-05-04</a:t>
             </a:fld>
             <a:endParaRPr lang="en-US"/>
           </a:p>
@@ -413,7 +413,7 @@
           <a:p>
             <a:fld id="{40C91488-E430-459B-BBDA-D24562176EC4}" type="datetimeFigureOut">
               <a:rPr lang="en-US" smtClean="0"/>
-              <a:t>2017-12-30</a:t>
+              <a:t>2018-05-04</a:t>
             </a:fld>
             <a:endParaRPr lang="en-US"/>
           </a:p>
@@ -593,7 +593,7 @@
           <a:p>
             <a:fld id="{40C91488-E430-459B-BBDA-D24562176EC4}" type="datetimeFigureOut">
               <a:rPr lang="en-US" smtClean="0"/>
-              <a:t>2017-12-30</a:t>
+              <a:t>2018-05-04</a:t>
             </a:fld>
             <a:endParaRPr lang="en-US"/>
           </a:p>
@@ -763,7 +763,7 @@
           <a:p>
             <a:fld id="{40C91488-E430-459B-BBDA-D24562176EC4}" type="datetimeFigureOut">
               <a:rPr lang="en-US" smtClean="0"/>
-              <a:t>2017-12-30</a:t>
+              <a:t>2018-05-04</a:t>
             </a:fld>
             <a:endParaRPr lang="en-US"/>
           </a:p>
@@ -1009,7 +1009,7 @@
           <a:p>
             <a:fld id="{40C91488-E430-459B-BBDA-D24562176EC4}" type="datetimeFigureOut">
               <a:rPr lang="en-US" smtClean="0"/>
-              <a:t>2017-12-30</a:t>
+              <a:t>2018-05-04</a:t>
             </a:fld>
             <a:endParaRPr lang="en-US"/>
           </a:p>
@@ -1241,7 +1241,7 @@
           <a:p>
             <a:fld id="{40C91488-E430-459B-BBDA-D24562176EC4}" type="datetimeFigureOut">
               <a:rPr lang="en-US" smtClean="0"/>
-              <a:t>2017-12-30</a:t>
+              <a:t>2018-05-04</a:t>
             </a:fld>
             <a:endParaRPr lang="en-US"/>
           </a:p>
@@ -1608,7 +1608,7 @@
           <a:p>
             <a:fld id="{40C91488-E430-459B-BBDA-D24562176EC4}" type="datetimeFigureOut">
               <a:rPr lang="en-US" smtClean="0"/>
-              <a:t>2017-12-30</a:t>
+              <a:t>2018-05-04</a:t>
             </a:fld>
             <a:endParaRPr lang="en-US"/>
           </a:p>
@@ -1726,7 +1726,7 @@
           <a:p>
             <a:fld id="{40C91488-E430-459B-BBDA-D24562176EC4}" type="datetimeFigureOut">
               <a:rPr lang="en-US" smtClean="0"/>
-              <a:t>2017-12-30</a:t>
+              <a:t>2018-05-04</a:t>
             </a:fld>
             <a:endParaRPr lang="en-US"/>
           </a:p>
@@ -1821,7 +1821,7 @@
           <a:p>
             <a:fld id="{40C91488-E430-459B-BBDA-D24562176EC4}" type="datetimeFigureOut">
               <a:rPr lang="en-US" smtClean="0"/>
-              <a:t>2017-12-30</a:t>
+              <a:t>2018-05-04</a:t>
             </a:fld>
             <a:endParaRPr lang="en-US"/>
           </a:p>
@@ -2098,7 +2098,7 @@
           <a:p>
             <a:fld id="{40C91488-E430-459B-BBDA-D24562176EC4}" type="datetimeFigureOut">
               <a:rPr lang="en-US" smtClean="0"/>
-              <a:t>2017-12-30</a:t>
+              <a:t>2018-05-04</a:t>
             </a:fld>
             <a:endParaRPr lang="en-US"/>
           </a:p>
@@ -2351,7 +2351,7 @@
           <a:p>
             <a:fld id="{40C91488-E430-459B-BBDA-D24562176EC4}" type="datetimeFigureOut">
               <a:rPr lang="en-US" smtClean="0"/>
-              <a:t>2017-12-30</a:t>
+              <a:t>2018-05-04</a:t>
             </a:fld>
             <a:endParaRPr lang="en-US"/>
           </a:p>
@@ -2564,7 +2564,7 @@
           <a:p>
             <a:fld id="{40C91488-E430-459B-BBDA-D24562176EC4}" type="datetimeFigureOut">
               <a:rPr lang="en-US" smtClean="0"/>
-              <a:t>2017-12-30</a:t>
+              <a:t>2018-05-04</a:t>
             </a:fld>
             <a:endParaRPr lang="en-US"/>
           </a:p>
@@ -6500,6 +6500,105 @@
           </p:txBody>
         </p:sp>
       </p:grpSp>
+      <p:grpSp>
+        <p:nvGrpSpPr>
+          <p:cNvPr id="101" name="Group 100"/>
+          <p:cNvGrpSpPr/>
+          <p:nvPr/>
+        </p:nvGrpSpPr>
+        <p:grpSpPr>
+          <a:xfrm>
+            <a:off x="6390381" y="4319815"/>
+            <a:ext cx="737831" cy="232754"/>
+            <a:chOff x="6390381" y="4319815"/>
+            <a:chExt cx="737831" cy="232754"/>
+          </a:xfrm>
+        </p:grpSpPr>
+        <p:pic>
+          <p:nvPicPr>
+            <p:cNvPr id="99" name="Picture 98"/>
+            <p:cNvPicPr>
+              <a:picLocks noChangeAspect="1"/>
+            </p:cNvPicPr>
+            <p:nvPr/>
+          </p:nvPicPr>
+          <p:blipFill>
+            <a:blip r:embed="rId35" cstate="print">
+              <a:extLst>
+                <a:ext uri="{28A0092B-C50C-407E-A947-70E740481C1C}">
+                  <a14:useLocalDpi xmlns:a14="http://schemas.microsoft.com/office/drawing/2010/main" val="0"/>
+                </a:ext>
+              </a:extLst>
+            </a:blip>
+            <a:stretch>
+              <a:fillRect/>
+            </a:stretch>
+          </p:blipFill>
+          <p:spPr>
+            <a:xfrm>
+              <a:off x="6390381" y="4319815"/>
+              <a:ext cx="210312" cy="210312"/>
+            </a:xfrm>
+            <a:prstGeom prst="rect">
+              <a:avLst/>
+            </a:prstGeom>
+          </p:spPr>
+        </p:pic>
+        <p:sp>
+          <p:nvSpPr>
+            <p:cNvPr id="100" name="TextBox 99"/>
+            <p:cNvSpPr txBox="1"/>
+            <p:nvPr/>
+          </p:nvSpPr>
+          <p:spPr>
+            <a:xfrm>
+              <a:off x="6596862" y="4337125"/>
+              <a:ext cx="531350" cy="215444"/>
+            </a:xfrm>
+            <a:prstGeom prst="rect">
+              <a:avLst/>
+            </a:prstGeom>
+            <a:noFill/>
+          </p:spPr>
+          <p:txBody>
+            <a:bodyPr wrap="square" rtlCol="0">
+              <a:spAutoFit/>
+            </a:bodyPr>
+            <a:lstStyle/>
+            <a:p>
+              <a:r>
+                <a:rPr lang="en-US" sz="800" dirty="0" err="1" smtClean="0">
+                  <a:solidFill>
+                    <a:schemeClr val="bg1"/>
+                  </a:solidFill>
+                </a:rPr>
+                <a:t>Vị</a:t>
+              </a:r>
+              <a:r>
+                <a:rPr lang="en-US" sz="800" dirty="0" smtClean="0">
+                  <a:solidFill>
+                    <a:schemeClr val="bg1"/>
+                  </a:solidFill>
+                </a:rPr>
+                <a:t> </a:t>
+              </a:r>
+              <a:r>
+                <a:rPr lang="en-US" sz="800" dirty="0" err="1" smtClean="0">
+                  <a:solidFill>
+                    <a:schemeClr val="bg1"/>
+                  </a:solidFill>
+                </a:rPr>
+                <a:t>Trí</a:t>
+              </a:r>
+              <a:endParaRPr lang="en-US" sz="800" dirty="0">
+                <a:solidFill>
+                  <a:schemeClr val="bg1"/>
+                </a:solidFill>
+              </a:endParaRPr>
+            </a:p>
+          </p:txBody>
+        </p:sp>
+      </p:grpSp>
     </p:spTree>
     <p:extLst>
       <p:ext uri="{BB962C8B-B14F-4D97-AF65-F5344CB8AC3E}">

</xml_diff>

<commit_message>
update giao dien dang nhap va animation trong danh tinh nguyen
</commit_message>
<xml_diff>
--- a/AD/Presentation1.pptx
+++ b/AD/Presentation1.pptx
@@ -243,7 +243,7 @@
           <a:p>
             <a:fld id="{40C91488-E430-459B-BBDA-D24562176EC4}" type="datetimeFigureOut">
               <a:rPr lang="en-US" smtClean="0"/>
-              <a:t>2018-05-04</a:t>
+              <a:t>2018-05-23</a:t>
             </a:fld>
             <a:endParaRPr lang="en-US"/>
           </a:p>
@@ -413,7 +413,7 @@
           <a:p>
             <a:fld id="{40C91488-E430-459B-BBDA-D24562176EC4}" type="datetimeFigureOut">
               <a:rPr lang="en-US" smtClean="0"/>
-              <a:t>2018-05-04</a:t>
+              <a:t>2018-05-23</a:t>
             </a:fld>
             <a:endParaRPr lang="en-US"/>
           </a:p>
@@ -593,7 +593,7 @@
           <a:p>
             <a:fld id="{40C91488-E430-459B-BBDA-D24562176EC4}" type="datetimeFigureOut">
               <a:rPr lang="en-US" smtClean="0"/>
-              <a:t>2018-05-04</a:t>
+              <a:t>2018-05-23</a:t>
             </a:fld>
             <a:endParaRPr lang="en-US"/>
           </a:p>
@@ -763,7 +763,7 @@
           <a:p>
             <a:fld id="{40C91488-E430-459B-BBDA-D24562176EC4}" type="datetimeFigureOut">
               <a:rPr lang="en-US" smtClean="0"/>
-              <a:t>2018-05-04</a:t>
+              <a:t>2018-05-23</a:t>
             </a:fld>
             <a:endParaRPr lang="en-US"/>
           </a:p>
@@ -1009,7 +1009,7 @@
           <a:p>
             <a:fld id="{40C91488-E430-459B-BBDA-D24562176EC4}" type="datetimeFigureOut">
               <a:rPr lang="en-US" smtClean="0"/>
-              <a:t>2018-05-04</a:t>
+              <a:t>2018-05-23</a:t>
             </a:fld>
             <a:endParaRPr lang="en-US"/>
           </a:p>
@@ -1241,7 +1241,7 @@
           <a:p>
             <a:fld id="{40C91488-E430-459B-BBDA-D24562176EC4}" type="datetimeFigureOut">
               <a:rPr lang="en-US" smtClean="0"/>
-              <a:t>2018-05-04</a:t>
+              <a:t>2018-05-23</a:t>
             </a:fld>
             <a:endParaRPr lang="en-US"/>
           </a:p>
@@ -1608,7 +1608,7 @@
           <a:p>
             <a:fld id="{40C91488-E430-459B-BBDA-D24562176EC4}" type="datetimeFigureOut">
               <a:rPr lang="en-US" smtClean="0"/>
-              <a:t>2018-05-04</a:t>
+              <a:t>2018-05-23</a:t>
             </a:fld>
             <a:endParaRPr lang="en-US"/>
           </a:p>
@@ -1726,7 +1726,7 @@
           <a:p>
             <a:fld id="{40C91488-E430-459B-BBDA-D24562176EC4}" type="datetimeFigureOut">
               <a:rPr lang="en-US" smtClean="0"/>
-              <a:t>2018-05-04</a:t>
+              <a:t>2018-05-23</a:t>
             </a:fld>
             <a:endParaRPr lang="en-US"/>
           </a:p>
@@ -1821,7 +1821,7 @@
           <a:p>
             <a:fld id="{40C91488-E430-459B-BBDA-D24562176EC4}" type="datetimeFigureOut">
               <a:rPr lang="en-US" smtClean="0"/>
-              <a:t>2018-05-04</a:t>
+              <a:t>2018-05-23</a:t>
             </a:fld>
             <a:endParaRPr lang="en-US"/>
           </a:p>
@@ -2098,7 +2098,7 @@
           <a:p>
             <a:fld id="{40C91488-E430-459B-BBDA-D24562176EC4}" type="datetimeFigureOut">
               <a:rPr lang="en-US" smtClean="0"/>
-              <a:t>2018-05-04</a:t>
+              <a:t>2018-05-23</a:t>
             </a:fld>
             <a:endParaRPr lang="en-US"/>
           </a:p>
@@ -2351,7 +2351,7 @@
           <a:p>
             <a:fld id="{40C91488-E430-459B-BBDA-D24562176EC4}" type="datetimeFigureOut">
               <a:rPr lang="en-US" smtClean="0"/>
-              <a:t>2018-05-04</a:t>
+              <a:t>2018-05-23</a:t>
             </a:fld>
             <a:endParaRPr lang="en-US"/>
           </a:p>
@@ -2564,7 +2564,7 @@
           <a:p>
             <a:fld id="{40C91488-E430-459B-BBDA-D24562176EC4}" type="datetimeFigureOut">
               <a:rPr lang="en-US" smtClean="0"/>
-              <a:t>2018-05-04</a:t>
+              <a:t>2018-05-23</a:t>
             </a:fld>
             <a:endParaRPr lang="en-US"/>
           </a:p>
@@ -6599,6 +6599,121 @@
           </p:txBody>
         </p:sp>
       </p:grpSp>
+      <p:grpSp>
+        <p:nvGrpSpPr>
+          <p:cNvPr id="103" name="Group 102"/>
+          <p:cNvGrpSpPr/>
+          <p:nvPr/>
+        </p:nvGrpSpPr>
+        <p:grpSpPr>
+          <a:xfrm>
+            <a:off x="5491715" y="6145706"/>
+            <a:ext cx="1119638" cy="251415"/>
+            <a:chOff x="5491715" y="6145706"/>
+            <a:chExt cx="1119638" cy="251415"/>
+          </a:xfrm>
+        </p:grpSpPr>
+        <p:pic>
+          <p:nvPicPr>
+            <p:cNvPr id="98" name="Picture 97"/>
+            <p:cNvPicPr>
+              <a:picLocks noChangeAspect="1"/>
+            </p:cNvPicPr>
+            <p:nvPr/>
+          </p:nvPicPr>
+          <p:blipFill>
+            <a:blip r:embed="rId36" cstate="print">
+              <a:extLst>
+                <a:ext uri="{28A0092B-C50C-407E-A947-70E740481C1C}">
+                  <a14:useLocalDpi xmlns:a14="http://schemas.microsoft.com/office/drawing/2010/main" val="0"/>
+                </a:ext>
+              </a:extLst>
+            </a:blip>
+            <a:stretch>
+              <a:fillRect/>
+            </a:stretch>
+          </p:blipFill>
+          <p:spPr>
+            <a:xfrm>
+              <a:off x="5491715" y="6145706"/>
+              <a:ext cx="246888" cy="246888"/>
+            </a:xfrm>
+            <a:prstGeom prst="rect">
+              <a:avLst/>
+            </a:prstGeom>
+          </p:spPr>
+        </p:pic>
+        <p:sp>
+          <p:nvSpPr>
+            <p:cNvPr id="102" name="TextBox 101"/>
+            <p:cNvSpPr txBox="1"/>
+            <p:nvPr/>
+          </p:nvSpPr>
+          <p:spPr>
+            <a:xfrm>
+              <a:off x="5738603" y="6166289"/>
+              <a:ext cx="872750" cy="230832"/>
+            </a:xfrm>
+            <a:prstGeom prst="rect">
+              <a:avLst/>
+            </a:prstGeom>
+            <a:noFill/>
+          </p:spPr>
+          <p:txBody>
+            <a:bodyPr wrap="square" rtlCol="0">
+              <a:spAutoFit/>
+            </a:bodyPr>
+            <a:lstStyle/>
+            <a:p>
+              <a:r>
+                <a:rPr lang="en-US" sz="900" dirty="0" err="1" smtClean="0">
+                  <a:solidFill>
+                    <a:schemeClr val="bg1"/>
+                  </a:solidFill>
+                </a:rPr>
+                <a:t>Xem</a:t>
+              </a:r>
+              <a:r>
+                <a:rPr lang="en-US" sz="900" dirty="0" smtClean="0">
+                  <a:solidFill>
+                    <a:schemeClr val="bg1"/>
+                  </a:solidFill>
+                </a:rPr>
+                <a:t> </a:t>
+              </a:r>
+              <a:r>
+                <a:rPr lang="en-US" sz="900" dirty="0" err="1" smtClean="0">
+                  <a:solidFill>
+                    <a:schemeClr val="bg1"/>
+                  </a:solidFill>
+                </a:rPr>
+                <a:t>Thời</a:t>
+              </a:r>
+              <a:r>
+                <a:rPr lang="en-US" sz="900" dirty="0" smtClean="0">
+                  <a:solidFill>
+                    <a:schemeClr val="bg1"/>
+                  </a:solidFill>
+                </a:rPr>
+                <a:t> </a:t>
+              </a:r>
+              <a:r>
+                <a:rPr lang="en-US" sz="900" dirty="0" err="1" smtClean="0">
+                  <a:solidFill>
+                    <a:schemeClr val="bg1"/>
+                  </a:solidFill>
+                </a:rPr>
+                <a:t>Tiết</a:t>
+              </a:r>
+              <a:endParaRPr lang="en-US" sz="900" dirty="0">
+                <a:solidFill>
+                  <a:schemeClr val="bg1"/>
+                </a:solidFill>
+              </a:endParaRPr>
+            </a:p>
+          </p:txBody>
+        </p:sp>
+      </p:grpSp>
     </p:spTree>
     <p:extLst>
       <p:ext uri="{BB962C8B-B14F-4D97-AF65-F5344CB8AC3E}">

</xml_diff>